<commit_message>
Criação de slides funcionando. O próximo passo é reajustar visualmente e procurar possíveis bugs.
</commit_message>
<xml_diff>
--- a/redencao.pptx
+++ b/redencao.pptx
@@ -16,32 +16,6 @@
     <p:sldId id="264" r:id="rId15"/>
     <p:sldId id="265" r:id="rId16"/>
     <p:sldId id="266" r:id="rId17"/>
-    <p:sldId id="267" r:id="rId18"/>
-    <p:sldId id="268" r:id="rId19"/>
-    <p:sldId id="269" r:id="rId20"/>
-    <p:sldId id="270" r:id="rId21"/>
-    <p:sldId id="271" r:id="rId22"/>
-    <p:sldId id="272" r:id="rId23"/>
-    <p:sldId id="273" r:id="rId24"/>
-    <p:sldId id="274" r:id="rId25"/>
-    <p:sldId id="275" r:id="rId26"/>
-    <p:sldId id="276" r:id="rId27"/>
-    <p:sldId id="277" r:id="rId28"/>
-    <p:sldId id="278" r:id="rId29"/>
-    <p:sldId id="279" r:id="rId30"/>
-    <p:sldId id="280" r:id="rId31"/>
-    <p:sldId id="281" r:id="rId32"/>
-    <p:sldId id="282" r:id="rId33"/>
-    <p:sldId id="283" r:id="rId34"/>
-    <p:sldId id="284" r:id="rId35"/>
-    <p:sldId id="285" r:id="rId36"/>
-    <p:sldId id="286" r:id="rId37"/>
-    <p:sldId id="287" r:id="rId38"/>
-    <p:sldId id="288" r:id="rId39"/>
-    <p:sldId id="289" r:id="rId40"/>
-    <p:sldId id="290" r:id="rId41"/>
-    <p:sldId id="291" r:id="rId42"/>
-    <p:sldId id="292" r:id="rId43"/>
   </p:sldIdLst>
   <p:sldSz cx="9144000" cy="6858000" type="screen4x3"/>
   <p:notesSz cx="6858000" cy="9144000"/>
@@ -3194,6 +3168,17 @@
         <p:txBody>
           <a:bodyPr/>
           <a:lstStyle/>
+          <a:p/>
+          <a:p>
+            <a:r>
+              <a:t>O passado já não mais tem poder pois novo sou</a:t>
+            </a:r>
+          </a:p>
+          <a:p>
+            <a:r>
+              <a:t>Nele vou viver, posso amar</a:t>
+            </a:r>
+          </a:p>
           <a:p>
             <a:r>
               <a:t>Toda morte e o sofrer não me assustarão jamais</a:t>
@@ -3255,6 +3240,17 @@
         <p:txBody>
           <a:bodyPr/>
           <a:lstStyle/>
+          <a:p/>
+          <a:p>
+            <a:r>
+              <a:t>Jesus Cristo Rei dos reis</a:t>
+            </a:r>
+          </a:p>
+          <a:p>
+            <a:r>
+              <a:t>Nos trouxe a redenção</a:t>
+            </a:r>
+          </a:p>
           <a:p>
             <a:r>
               <a:t>A esperança retornou</a:t>
@@ -3263,486 +3259,6 @@
           <a:p>
             <a:r>
               <a:t>Graça e paz nos revelou</a:t>
-            </a:r>
-          </a:p>
-        </p:txBody>
-      </p:sp>
-      <p:sp>
-        <p:nvSpPr>
-          <p:cNvPr id="3" name="Subtitle 2"/>
-          <p:cNvSpPr>
-            <a:spLocks noGrp="1"/>
-          </p:cNvSpPr>
-          <p:nvPr>
-            <p:ph type="subTitle" idx="1"/>
-          </p:nvPr>
-        </p:nvSpPr>
-        <p:spPr/>
-        <p:txBody>
-          <a:bodyPr/>
-          <a:lstStyle/>
-          <a:p/>
-        </p:txBody>
-      </p:sp>
-    </p:spTree>
-  </p:cSld>
-  <p:clrMapOvr>
-    <a:masterClrMapping/>
-  </p:clrMapOvr>
-</p:sld>
-</file>
-
-<file path=ppt/slides/slide12.xml><?xml version="1.0" encoding="utf-8"?>
-<p:sld xmlns:a="http://schemas.openxmlformats.org/drawingml/2006/main" xmlns:p="http://schemas.openxmlformats.org/presentationml/2006/main" xmlns:r="http://schemas.openxmlformats.org/officeDocument/2006/relationships">
-  <p:cSld>
-    <p:spTree>
-      <p:nvGrpSpPr>
-        <p:cNvPr id="1" name=""/>
-        <p:cNvGrpSpPr/>
-        <p:nvPr/>
-      </p:nvGrpSpPr>
-      <p:grpSpPr/>
-      <p:sp>
-        <p:nvSpPr>
-          <p:cNvPr id="2" name="Title 1"/>
-          <p:cNvSpPr>
-            <a:spLocks noGrp="1"/>
-          </p:cNvSpPr>
-          <p:nvPr>
-            <p:ph type="ctrTitle"/>
-          </p:nvPr>
-        </p:nvSpPr>
-        <p:spPr/>
-        <p:txBody>
-          <a:bodyPr/>
-          <a:lstStyle/>
-          <a:p>
-            <a:r>
-              <a:t>Nos trouxe a redenção</a:t>
-            </a:r>
-          </a:p>
-          <a:p>
-            <a:r>
-              <a:t>A esperança retornou</a:t>
-            </a:r>
-          </a:p>
-        </p:txBody>
-      </p:sp>
-      <p:sp>
-        <p:nvSpPr>
-          <p:cNvPr id="3" name="Subtitle 2"/>
-          <p:cNvSpPr>
-            <a:spLocks noGrp="1"/>
-          </p:cNvSpPr>
-          <p:nvPr>
-            <p:ph type="subTitle" idx="1"/>
-          </p:nvPr>
-        </p:nvSpPr>
-        <p:spPr/>
-        <p:txBody>
-          <a:bodyPr/>
-          <a:lstStyle/>
-          <a:p/>
-        </p:txBody>
-      </p:sp>
-    </p:spTree>
-  </p:cSld>
-  <p:clrMapOvr>
-    <a:masterClrMapping/>
-  </p:clrMapOvr>
-</p:sld>
-</file>
-
-<file path=ppt/slides/slide13.xml><?xml version="1.0" encoding="utf-8"?>
-<p:sld xmlns:a="http://schemas.openxmlformats.org/drawingml/2006/main" xmlns:p="http://schemas.openxmlformats.org/presentationml/2006/main" xmlns:r="http://schemas.openxmlformats.org/officeDocument/2006/relationships">
-  <p:cSld>
-    <p:spTree>
-      <p:nvGrpSpPr>
-        <p:cNvPr id="1" name=""/>
-        <p:cNvGrpSpPr/>
-        <p:nvPr/>
-      </p:nvGrpSpPr>
-      <p:grpSpPr/>
-      <p:sp>
-        <p:nvSpPr>
-          <p:cNvPr id="2" name="Title 1"/>
-          <p:cNvSpPr>
-            <a:spLocks noGrp="1"/>
-          </p:cNvSpPr>
-          <p:nvPr>
-            <p:ph type="ctrTitle"/>
-          </p:nvPr>
-        </p:nvSpPr>
-        <p:spPr/>
-        <p:txBody>
-          <a:bodyPr/>
-          <a:lstStyle/>
-          <a:p>
-            <a:r>
-              <a:t>Jesus Cristo Rei dos reis</a:t>
-            </a:r>
-          </a:p>
-          <a:p>
-            <a:r>
-              <a:t>Nos trouxe a redenção</a:t>
-            </a:r>
-          </a:p>
-        </p:txBody>
-      </p:sp>
-      <p:sp>
-        <p:nvSpPr>
-          <p:cNvPr id="3" name="Subtitle 2"/>
-          <p:cNvSpPr>
-            <a:spLocks noGrp="1"/>
-          </p:cNvSpPr>
-          <p:nvPr>
-            <p:ph type="subTitle" idx="1"/>
-          </p:nvPr>
-        </p:nvSpPr>
-        <p:spPr/>
-        <p:txBody>
-          <a:bodyPr/>
-          <a:lstStyle/>
-          <a:p/>
-        </p:txBody>
-      </p:sp>
-    </p:spTree>
-  </p:cSld>
-  <p:clrMapOvr>
-    <a:masterClrMapping/>
-  </p:clrMapOvr>
-</p:sld>
-</file>
-
-<file path=ppt/slides/slide14.xml><?xml version="1.0" encoding="utf-8"?>
-<p:sld xmlns:a="http://schemas.openxmlformats.org/drawingml/2006/main" xmlns:p="http://schemas.openxmlformats.org/presentationml/2006/main" xmlns:r="http://schemas.openxmlformats.org/officeDocument/2006/relationships">
-  <p:cSld>
-    <p:spTree>
-      <p:nvGrpSpPr>
-        <p:cNvPr id="1" name=""/>
-        <p:cNvGrpSpPr/>
-        <p:nvPr/>
-      </p:nvGrpSpPr>
-      <p:grpSpPr/>
-      <p:sp>
-        <p:nvSpPr>
-          <p:cNvPr id="2" name="Title 1"/>
-          <p:cNvSpPr>
-            <a:spLocks noGrp="1"/>
-          </p:cNvSpPr>
-          <p:nvPr>
-            <p:ph type="ctrTitle"/>
-          </p:nvPr>
-        </p:nvSpPr>
-        <p:spPr/>
-        <p:txBody>
-          <a:bodyPr/>
-          <a:lstStyle/>
-          <a:p/>
-          <a:p>
-            <a:r>
-              <a:t>Jesus Cristo Rei dos reis</a:t>
-            </a:r>
-          </a:p>
-        </p:txBody>
-      </p:sp>
-      <p:sp>
-        <p:nvSpPr>
-          <p:cNvPr id="3" name="Subtitle 2"/>
-          <p:cNvSpPr>
-            <a:spLocks noGrp="1"/>
-          </p:cNvSpPr>
-          <p:nvPr>
-            <p:ph type="subTitle" idx="1"/>
-          </p:nvPr>
-        </p:nvSpPr>
-        <p:spPr/>
-        <p:txBody>
-          <a:bodyPr/>
-          <a:lstStyle/>
-          <a:p/>
-        </p:txBody>
-      </p:sp>
-    </p:spTree>
-  </p:cSld>
-  <p:clrMapOvr>
-    <a:masterClrMapping/>
-  </p:clrMapOvr>
-</p:sld>
-</file>
-
-<file path=ppt/slides/slide15.xml><?xml version="1.0" encoding="utf-8"?>
-<p:sld xmlns:a="http://schemas.openxmlformats.org/drawingml/2006/main" xmlns:p="http://schemas.openxmlformats.org/presentationml/2006/main" xmlns:r="http://schemas.openxmlformats.org/officeDocument/2006/relationships">
-  <p:cSld>
-    <p:spTree>
-      <p:nvGrpSpPr>
-        <p:cNvPr id="1" name=""/>
-        <p:cNvGrpSpPr/>
-        <p:nvPr/>
-      </p:nvGrpSpPr>
-      <p:grpSpPr/>
-      <p:sp>
-        <p:nvSpPr>
-          <p:cNvPr id="2" name="Title 1"/>
-          <p:cNvSpPr>
-            <a:spLocks noGrp="1"/>
-          </p:cNvSpPr>
-          <p:nvPr>
-            <p:ph type="ctrTitle"/>
-          </p:nvPr>
-        </p:nvSpPr>
-        <p:spPr/>
-        <p:txBody>
-          <a:bodyPr/>
-          <a:lstStyle/>
-          <a:p>
-            <a:r>
-              <a:t>Nele vou viver, posso amar</a:t>
-            </a:r>
-          </a:p>
-          <a:p>
-            <a:r>
-              <a:t>Toda morte e o sofrer não me assustarão jamais</a:t>
-            </a:r>
-          </a:p>
-        </p:txBody>
-      </p:sp>
-      <p:sp>
-        <p:nvSpPr>
-          <p:cNvPr id="3" name="Subtitle 2"/>
-          <p:cNvSpPr>
-            <a:spLocks noGrp="1"/>
-          </p:cNvSpPr>
-          <p:nvPr>
-            <p:ph type="subTitle" idx="1"/>
-          </p:nvPr>
-        </p:nvSpPr>
-        <p:spPr/>
-        <p:txBody>
-          <a:bodyPr/>
-          <a:lstStyle/>
-          <a:p/>
-        </p:txBody>
-      </p:sp>
-    </p:spTree>
-  </p:cSld>
-  <p:clrMapOvr>
-    <a:masterClrMapping/>
-  </p:clrMapOvr>
-</p:sld>
-</file>
-
-<file path=ppt/slides/slide16.xml><?xml version="1.0" encoding="utf-8"?>
-<p:sld xmlns:a="http://schemas.openxmlformats.org/drawingml/2006/main" xmlns:p="http://schemas.openxmlformats.org/presentationml/2006/main" xmlns:r="http://schemas.openxmlformats.org/officeDocument/2006/relationships">
-  <p:cSld>
-    <p:spTree>
-      <p:nvGrpSpPr>
-        <p:cNvPr id="1" name=""/>
-        <p:cNvGrpSpPr/>
-        <p:nvPr/>
-      </p:nvGrpSpPr>
-      <p:grpSpPr/>
-      <p:sp>
-        <p:nvSpPr>
-          <p:cNvPr id="2" name="Title 1"/>
-          <p:cNvSpPr>
-            <a:spLocks noGrp="1"/>
-          </p:cNvSpPr>
-          <p:nvPr>
-            <p:ph type="ctrTitle"/>
-          </p:nvPr>
-        </p:nvSpPr>
-        <p:spPr/>
-        <p:txBody>
-          <a:bodyPr/>
-          <a:lstStyle/>
-          <a:p>
-            <a:r>
-              <a:t>O passado já não mais tem poder pois novo sou</a:t>
-            </a:r>
-          </a:p>
-          <a:p>
-            <a:r>
-              <a:t>Nele vou viver, posso amar</a:t>
-            </a:r>
-          </a:p>
-        </p:txBody>
-      </p:sp>
-      <p:sp>
-        <p:nvSpPr>
-          <p:cNvPr id="3" name="Subtitle 2"/>
-          <p:cNvSpPr>
-            <a:spLocks noGrp="1"/>
-          </p:cNvSpPr>
-          <p:nvPr>
-            <p:ph type="subTitle" idx="1"/>
-          </p:nvPr>
-        </p:nvSpPr>
-        <p:spPr/>
-        <p:txBody>
-          <a:bodyPr/>
-          <a:lstStyle/>
-          <a:p/>
-        </p:txBody>
-      </p:sp>
-    </p:spTree>
-  </p:cSld>
-  <p:clrMapOvr>
-    <a:masterClrMapping/>
-  </p:clrMapOvr>
-</p:sld>
-</file>
-
-<file path=ppt/slides/slide17.xml><?xml version="1.0" encoding="utf-8"?>
-<p:sld xmlns:a="http://schemas.openxmlformats.org/drawingml/2006/main" xmlns:p="http://schemas.openxmlformats.org/presentationml/2006/main" xmlns:r="http://schemas.openxmlformats.org/officeDocument/2006/relationships">
-  <p:cSld>
-    <p:spTree>
-      <p:nvGrpSpPr>
-        <p:cNvPr id="1" name=""/>
-        <p:cNvGrpSpPr/>
-        <p:nvPr/>
-      </p:nvGrpSpPr>
-      <p:grpSpPr/>
-      <p:sp>
-        <p:nvSpPr>
-          <p:cNvPr id="2" name="Title 1"/>
-          <p:cNvSpPr>
-            <a:spLocks noGrp="1"/>
-          </p:cNvSpPr>
-          <p:nvPr>
-            <p:ph type="ctrTitle"/>
-          </p:nvPr>
-        </p:nvSpPr>
-        <p:spPr/>
-        <p:txBody>
-          <a:bodyPr/>
-          <a:lstStyle/>
-          <a:p/>
-          <a:p>
-            <a:r>
-              <a:t>O passado já não mais tem poder pois novo sou</a:t>
-            </a:r>
-          </a:p>
-        </p:txBody>
-      </p:sp>
-      <p:sp>
-        <p:nvSpPr>
-          <p:cNvPr id="3" name="Subtitle 2"/>
-          <p:cNvSpPr>
-            <a:spLocks noGrp="1"/>
-          </p:cNvSpPr>
-          <p:nvPr>
-            <p:ph type="subTitle" idx="1"/>
-          </p:nvPr>
-        </p:nvSpPr>
-        <p:spPr/>
-        <p:txBody>
-          <a:bodyPr/>
-          <a:lstStyle/>
-          <a:p/>
-        </p:txBody>
-      </p:sp>
-    </p:spTree>
-  </p:cSld>
-  <p:clrMapOvr>
-    <a:masterClrMapping/>
-  </p:clrMapOvr>
-</p:sld>
-</file>
-
-<file path=ppt/slides/slide18.xml><?xml version="1.0" encoding="utf-8"?>
-<p:sld xmlns:a="http://schemas.openxmlformats.org/drawingml/2006/main" xmlns:p="http://schemas.openxmlformats.org/presentationml/2006/main" xmlns:r="http://schemas.openxmlformats.org/officeDocument/2006/relationships">
-  <p:cSld>
-    <p:spTree>
-      <p:nvGrpSpPr>
-        <p:cNvPr id="1" name=""/>
-        <p:cNvGrpSpPr/>
-        <p:nvPr/>
-      </p:nvGrpSpPr>
-      <p:grpSpPr/>
-      <p:sp>
-        <p:nvSpPr>
-          <p:cNvPr id="2" name="Title 1"/>
-          <p:cNvSpPr>
-            <a:spLocks noGrp="1"/>
-          </p:cNvSpPr>
-          <p:nvPr>
-            <p:ph type="ctrTitle"/>
-          </p:nvPr>
-        </p:nvSpPr>
-        <p:spPr/>
-        <p:txBody>
-          <a:bodyPr/>
-          <a:lstStyle/>
-          <a:p>
-            <a:r>
-              <a:t>Tudo entregar, vou me render, aos Seus pés vou me lançar</a:t>
-            </a:r>
-          </a:p>
-          <a:p>
-            <a:r>
-              <a:t>Tudo entregar, vou me render, aos Seus pés vou me lançar</a:t>
-            </a:r>
-          </a:p>
-        </p:txBody>
-      </p:sp>
-      <p:sp>
-        <p:nvSpPr>
-          <p:cNvPr id="3" name="Subtitle 2"/>
-          <p:cNvSpPr>
-            <a:spLocks noGrp="1"/>
-          </p:cNvSpPr>
-          <p:nvPr>
-            <p:ph type="subTitle" idx="1"/>
-          </p:nvPr>
-        </p:nvSpPr>
-        <p:spPr/>
-        <p:txBody>
-          <a:bodyPr/>
-          <a:lstStyle/>
-          <a:p/>
-        </p:txBody>
-      </p:sp>
-    </p:spTree>
-  </p:cSld>
-  <p:clrMapOvr>
-    <a:masterClrMapping/>
-  </p:clrMapOvr>
-</p:sld>
-</file>
-
-<file path=ppt/slides/slide19.xml><?xml version="1.0" encoding="utf-8"?>
-<p:sld xmlns:a="http://schemas.openxmlformats.org/drawingml/2006/main" xmlns:p="http://schemas.openxmlformats.org/presentationml/2006/main" xmlns:r="http://schemas.openxmlformats.org/officeDocument/2006/relationships">
-  <p:cSld>
-    <p:spTree>
-      <p:nvGrpSpPr>
-        <p:cNvPr id="1" name=""/>
-        <p:cNvGrpSpPr/>
-        <p:nvPr/>
-      </p:nvGrpSpPr>
-      <p:grpSpPr/>
-      <p:sp>
-        <p:nvSpPr>
-          <p:cNvPr id="2" name="Title 1"/>
-          <p:cNvSpPr>
-            <a:spLocks noGrp="1"/>
-          </p:cNvSpPr>
-          <p:nvPr>
-            <p:ph type="ctrTitle"/>
-          </p:nvPr>
-        </p:nvSpPr>
-        <p:spPr/>
-        <p:txBody>
-          <a:bodyPr/>
-          <a:lstStyle/>
-          <a:p>
-            <a:r>
-              <a:t>Tudo entregar, vou me render, aos Seus pés vou me lançar</a:t>
-            </a:r>
-          </a:p>
-          <a:p>
-            <a:r>
-              <a:t>Tudo entregar, vou me render, aos Seus pés vou me lançar</a:t>
             </a:r>
           </a:p>
         </p:txBody>
@@ -3798,606 +3314,17 @@
           <a:lstStyle/>
           <a:p>
             <a:r>
+              <a:t>Vivo hoje estou aqui</a:t>
+            </a:r>
+          </a:p>
+          <a:p>
+            <a:r>
               <a:t>Pois Ele decidiu me amar</a:t>
             </a:r>
           </a:p>
           <a:p>
             <a:r>
               <a:t>E então eu posso livre andar</a:t>
-            </a:r>
-          </a:p>
-        </p:txBody>
-      </p:sp>
-      <p:sp>
-        <p:nvSpPr>
-          <p:cNvPr id="3" name="Subtitle 2"/>
-          <p:cNvSpPr>
-            <a:spLocks noGrp="1"/>
-          </p:cNvSpPr>
-          <p:nvPr>
-            <p:ph type="subTitle" idx="1"/>
-          </p:nvPr>
-        </p:nvSpPr>
-        <p:spPr/>
-        <p:txBody>
-          <a:bodyPr/>
-          <a:lstStyle/>
-          <a:p/>
-        </p:txBody>
-      </p:sp>
-    </p:spTree>
-  </p:cSld>
-  <p:clrMapOvr>
-    <a:masterClrMapping/>
-  </p:clrMapOvr>
-</p:sld>
-</file>
-
-<file path=ppt/slides/slide20.xml><?xml version="1.0" encoding="utf-8"?>
-<p:sld xmlns:a="http://schemas.openxmlformats.org/drawingml/2006/main" xmlns:p="http://schemas.openxmlformats.org/presentationml/2006/main" xmlns:r="http://schemas.openxmlformats.org/officeDocument/2006/relationships">
-  <p:cSld>
-    <p:spTree>
-      <p:nvGrpSpPr>
-        <p:cNvPr id="1" name=""/>
-        <p:cNvGrpSpPr/>
-        <p:nvPr/>
-      </p:nvGrpSpPr>
-      <p:grpSpPr/>
-      <p:sp>
-        <p:nvSpPr>
-          <p:cNvPr id="2" name="Title 1"/>
-          <p:cNvSpPr>
-            <a:spLocks noGrp="1"/>
-          </p:cNvSpPr>
-          <p:nvPr>
-            <p:ph type="ctrTitle"/>
-          </p:nvPr>
-        </p:nvSpPr>
-        <p:spPr/>
-        <p:txBody>
-          <a:bodyPr/>
-          <a:lstStyle/>
-          <a:p/>
-          <a:p>
-            <a:r>
-              <a:t>Tudo entregar, vou me render, aos Seus pés vou me lançar</a:t>
-            </a:r>
-          </a:p>
-        </p:txBody>
-      </p:sp>
-      <p:sp>
-        <p:nvSpPr>
-          <p:cNvPr id="3" name="Subtitle 2"/>
-          <p:cNvSpPr>
-            <a:spLocks noGrp="1"/>
-          </p:cNvSpPr>
-          <p:nvPr>
-            <p:ph type="subTitle" idx="1"/>
-          </p:nvPr>
-        </p:nvSpPr>
-        <p:spPr/>
-        <p:txBody>
-          <a:bodyPr/>
-          <a:lstStyle/>
-          <a:p/>
-        </p:txBody>
-      </p:sp>
-    </p:spTree>
-  </p:cSld>
-  <p:clrMapOvr>
-    <a:masterClrMapping/>
-  </p:clrMapOvr>
-</p:sld>
-</file>
-
-<file path=ppt/slides/slide21.xml><?xml version="1.0" encoding="utf-8"?>
-<p:sld xmlns:a="http://schemas.openxmlformats.org/drawingml/2006/main" xmlns:p="http://schemas.openxmlformats.org/presentationml/2006/main" xmlns:r="http://schemas.openxmlformats.org/officeDocument/2006/relationships">
-  <p:cSld>
-    <p:spTree>
-      <p:nvGrpSpPr>
-        <p:cNvPr id="1" name=""/>
-        <p:cNvGrpSpPr/>
-        <p:nvPr/>
-      </p:nvGrpSpPr>
-      <p:grpSpPr/>
-      <p:sp>
-        <p:nvSpPr>
-          <p:cNvPr id="2" name="Title 1"/>
-          <p:cNvSpPr>
-            <a:spLocks noGrp="1"/>
-          </p:cNvSpPr>
-          <p:nvPr>
-            <p:ph type="ctrTitle"/>
-          </p:nvPr>
-        </p:nvSpPr>
-        <p:spPr/>
-        <p:txBody>
-          <a:bodyPr/>
-          <a:lstStyle/>
-          <a:p>
-            <a:r>
-              <a:t>Nele vou viver, posso amar</a:t>
-            </a:r>
-          </a:p>
-          <a:p>
-            <a:r>
-              <a:t>Toda morte e o sofrer não me assustarão jamais</a:t>
-            </a:r>
-          </a:p>
-        </p:txBody>
-      </p:sp>
-      <p:sp>
-        <p:nvSpPr>
-          <p:cNvPr id="3" name="Subtitle 2"/>
-          <p:cNvSpPr>
-            <a:spLocks noGrp="1"/>
-          </p:cNvSpPr>
-          <p:nvPr>
-            <p:ph type="subTitle" idx="1"/>
-          </p:nvPr>
-        </p:nvSpPr>
-        <p:spPr/>
-        <p:txBody>
-          <a:bodyPr/>
-          <a:lstStyle/>
-          <a:p/>
-        </p:txBody>
-      </p:sp>
-    </p:spTree>
-  </p:cSld>
-  <p:clrMapOvr>
-    <a:masterClrMapping/>
-  </p:clrMapOvr>
-</p:sld>
-</file>
-
-<file path=ppt/slides/slide22.xml><?xml version="1.0" encoding="utf-8"?>
-<p:sld xmlns:a="http://schemas.openxmlformats.org/drawingml/2006/main" xmlns:p="http://schemas.openxmlformats.org/presentationml/2006/main" xmlns:r="http://schemas.openxmlformats.org/officeDocument/2006/relationships">
-  <p:cSld>
-    <p:spTree>
-      <p:nvGrpSpPr>
-        <p:cNvPr id="1" name=""/>
-        <p:cNvGrpSpPr/>
-        <p:nvPr/>
-      </p:nvGrpSpPr>
-      <p:grpSpPr/>
-      <p:sp>
-        <p:nvSpPr>
-          <p:cNvPr id="2" name="Title 1"/>
-          <p:cNvSpPr>
-            <a:spLocks noGrp="1"/>
-          </p:cNvSpPr>
-          <p:nvPr>
-            <p:ph type="ctrTitle"/>
-          </p:nvPr>
-        </p:nvSpPr>
-        <p:spPr/>
-        <p:txBody>
-          <a:bodyPr/>
-          <a:lstStyle/>
-          <a:p>
-            <a:r>
-              <a:t>O passado já não mais tem poder pois novo sou</a:t>
-            </a:r>
-          </a:p>
-          <a:p>
-            <a:r>
-              <a:t>Nele vou viver, posso amar</a:t>
-            </a:r>
-          </a:p>
-        </p:txBody>
-      </p:sp>
-      <p:sp>
-        <p:nvSpPr>
-          <p:cNvPr id="3" name="Subtitle 2"/>
-          <p:cNvSpPr>
-            <a:spLocks noGrp="1"/>
-          </p:cNvSpPr>
-          <p:nvPr>
-            <p:ph type="subTitle" idx="1"/>
-          </p:nvPr>
-        </p:nvSpPr>
-        <p:spPr/>
-        <p:txBody>
-          <a:bodyPr/>
-          <a:lstStyle/>
-          <a:p/>
-        </p:txBody>
-      </p:sp>
-    </p:spTree>
-  </p:cSld>
-  <p:clrMapOvr>
-    <a:masterClrMapping/>
-  </p:clrMapOvr>
-</p:sld>
-</file>
-
-<file path=ppt/slides/slide23.xml><?xml version="1.0" encoding="utf-8"?>
-<p:sld xmlns:a="http://schemas.openxmlformats.org/drawingml/2006/main" xmlns:p="http://schemas.openxmlformats.org/presentationml/2006/main" xmlns:r="http://schemas.openxmlformats.org/officeDocument/2006/relationships">
-  <p:cSld>
-    <p:spTree>
-      <p:nvGrpSpPr>
-        <p:cNvPr id="1" name=""/>
-        <p:cNvGrpSpPr/>
-        <p:nvPr/>
-      </p:nvGrpSpPr>
-      <p:grpSpPr/>
-      <p:sp>
-        <p:nvSpPr>
-          <p:cNvPr id="2" name="Title 1"/>
-          <p:cNvSpPr>
-            <a:spLocks noGrp="1"/>
-          </p:cNvSpPr>
-          <p:nvPr>
-            <p:ph type="ctrTitle"/>
-          </p:nvPr>
-        </p:nvSpPr>
-        <p:spPr/>
-        <p:txBody>
-          <a:bodyPr/>
-          <a:lstStyle/>
-          <a:p/>
-          <a:p>
-            <a:r>
-              <a:t>O passado já não mais tem poder pois novo sou</a:t>
-            </a:r>
-          </a:p>
-        </p:txBody>
-      </p:sp>
-      <p:sp>
-        <p:nvSpPr>
-          <p:cNvPr id="3" name="Subtitle 2"/>
-          <p:cNvSpPr>
-            <a:spLocks noGrp="1"/>
-          </p:cNvSpPr>
-          <p:nvPr>
-            <p:ph type="subTitle" idx="1"/>
-          </p:nvPr>
-        </p:nvSpPr>
-        <p:spPr/>
-        <p:txBody>
-          <a:bodyPr/>
-          <a:lstStyle/>
-          <a:p/>
-        </p:txBody>
-      </p:sp>
-    </p:spTree>
-  </p:cSld>
-  <p:clrMapOvr>
-    <a:masterClrMapping/>
-  </p:clrMapOvr>
-</p:sld>
-</file>
-
-<file path=ppt/slides/slide24.xml><?xml version="1.0" encoding="utf-8"?>
-<p:sld xmlns:a="http://schemas.openxmlformats.org/drawingml/2006/main" xmlns:p="http://schemas.openxmlformats.org/presentationml/2006/main" xmlns:r="http://schemas.openxmlformats.org/officeDocument/2006/relationships">
-  <p:cSld>
-    <p:spTree>
-      <p:nvGrpSpPr>
-        <p:cNvPr id="1" name=""/>
-        <p:cNvGrpSpPr/>
-        <p:nvPr/>
-      </p:nvGrpSpPr>
-      <p:grpSpPr/>
-      <p:sp>
-        <p:nvSpPr>
-          <p:cNvPr id="2" name="Title 1"/>
-          <p:cNvSpPr>
-            <a:spLocks noGrp="1"/>
-          </p:cNvSpPr>
-          <p:nvPr>
-            <p:ph type="ctrTitle"/>
-          </p:nvPr>
-        </p:nvSpPr>
-        <p:spPr/>
-        <p:txBody>
-          <a:bodyPr/>
-          <a:lstStyle/>
-          <a:p>
-            <a:r>
-              <a:t>O Seu sangue sobre mim</a:t>
-            </a:r>
-          </a:p>
-          <a:p>
-            <a:r>
-              <a:t>Me comprou me restaurou</a:t>
-            </a:r>
-          </a:p>
-        </p:txBody>
-      </p:sp>
-      <p:sp>
-        <p:nvSpPr>
-          <p:cNvPr id="3" name="Subtitle 2"/>
-          <p:cNvSpPr>
-            <a:spLocks noGrp="1"/>
-          </p:cNvSpPr>
-          <p:nvPr>
-            <p:ph type="subTitle" idx="1"/>
-          </p:nvPr>
-        </p:nvSpPr>
-        <p:spPr/>
-        <p:txBody>
-          <a:bodyPr/>
-          <a:lstStyle/>
-          <a:p/>
-        </p:txBody>
-      </p:sp>
-    </p:spTree>
-  </p:cSld>
-  <p:clrMapOvr>
-    <a:masterClrMapping/>
-  </p:clrMapOvr>
-</p:sld>
-</file>
-
-<file path=ppt/slides/slide25.xml><?xml version="1.0" encoding="utf-8"?>
-<p:sld xmlns:a="http://schemas.openxmlformats.org/drawingml/2006/main" xmlns:p="http://schemas.openxmlformats.org/presentationml/2006/main" xmlns:r="http://schemas.openxmlformats.org/officeDocument/2006/relationships">
-  <p:cSld>
-    <p:spTree>
-      <p:nvGrpSpPr>
-        <p:cNvPr id="1" name=""/>
-        <p:cNvGrpSpPr/>
-        <p:nvPr/>
-      </p:nvGrpSpPr>
-      <p:grpSpPr/>
-      <p:sp>
-        <p:nvSpPr>
-          <p:cNvPr id="2" name="Title 1"/>
-          <p:cNvSpPr>
-            <a:spLocks noGrp="1"/>
-          </p:cNvSpPr>
-          <p:nvPr>
-            <p:ph type="ctrTitle"/>
-          </p:nvPr>
-        </p:nvSpPr>
-        <p:spPr/>
-        <p:txBody>
-          <a:bodyPr/>
-          <a:lstStyle/>
-          <a:p/>
-          <a:p>
-            <a:r>
-              <a:t>O Seu sangue sobre mim</a:t>
-            </a:r>
-          </a:p>
-        </p:txBody>
-      </p:sp>
-      <p:sp>
-        <p:nvSpPr>
-          <p:cNvPr id="3" name="Subtitle 2"/>
-          <p:cNvSpPr>
-            <a:spLocks noGrp="1"/>
-          </p:cNvSpPr>
-          <p:nvPr>
-            <p:ph type="subTitle" idx="1"/>
-          </p:nvPr>
-        </p:nvSpPr>
-        <p:spPr/>
-        <p:txBody>
-          <a:bodyPr/>
-          <a:lstStyle/>
-          <a:p/>
-        </p:txBody>
-      </p:sp>
-    </p:spTree>
-  </p:cSld>
-  <p:clrMapOvr>
-    <a:masterClrMapping/>
-  </p:clrMapOvr>
-</p:sld>
-</file>
-
-<file path=ppt/slides/slide26.xml><?xml version="1.0" encoding="utf-8"?>
-<p:sld xmlns:a="http://schemas.openxmlformats.org/drawingml/2006/main" xmlns:p="http://schemas.openxmlformats.org/presentationml/2006/main" xmlns:r="http://schemas.openxmlformats.org/officeDocument/2006/relationships">
-  <p:cSld>
-    <p:spTree>
-      <p:nvGrpSpPr>
-        <p:cNvPr id="1" name=""/>
-        <p:cNvGrpSpPr/>
-        <p:nvPr/>
-      </p:nvGrpSpPr>
-      <p:grpSpPr/>
-      <p:sp>
-        <p:nvSpPr>
-          <p:cNvPr id="2" name="Title 1"/>
-          <p:cNvSpPr>
-            <a:spLocks noGrp="1"/>
-          </p:cNvSpPr>
-          <p:nvPr>
-            <p:ph type="ctrTitle"/>
-          </p:nvPr>
-        </p:nvSpPr>
-        <p:spPr/>
-        <p:txBody>
-          <a:bodyPr/>
-          <a:lstStyle/>
-          <a:p>
-            <a:r>
-              <a:t>Vivo hoje estou aqui</a:t>
-            </a:r>
-          </a:p>
-          <a:p>
-            <a:r>
-              <a:t>Pois Ele decidiu me amar</a:t>
-            </a:r>
-          </a:p>
-        </p:txBody>
-      </p:sp>
-      <p:sp>
-        <p:nvSpPr>
-          <p:cNvPr id="3" name="Subtitle 2"/>
-          <p:cNvSpPr>
-            <a:spLocks noGrp="1"/>
-          </p:cNvSpPr>
-          <p:nvPr>
-            <p:ph type="subTitle" idx="1"/>
-          </p:nvPr>
-        </p:nvSpPr>
-        <p:spPr/>
-        <p:txBody>
-          <a:bodyPr/>
-          <a:lstStyle/>
-          <a:p/>
-        </p:txBody>
-      </p:sp>
-    </p:spTree>
-  </p:cSld>
-  <p:clrMapOvr>
-    <a:masterClrMapping/>
-  </p:clrMapOvr>
-</p:sld>
-</file>
-
-<file path=ppt/slides/slide27.xml><?xml version="1.0" encoding="utf-8"?>
-<p:sld xmlns:a="http://schemas.openxmlformats.org/drawingml/2006/main" xmlns:p="http://schemas.openxmlformats.org/presentationml/2006/main" xmlns:r="http://schemas.openxmlformats.org/officeDocument/2006/relationships">
-  <p:cSld>
-    <p:spTree>
-      <p:nvGrpSpPr>
-        <p:cNvPr id="1" name=""/>
-        <p:cNvGrpSpPr/>
-        <p:nvPr/>
-      </p:nvGrpSpPr>
-      <p:grpSpPr/>
-      <p:sp>
-        <p:nvSpPr>
-          <p:cNvPr id="2" name="Title 1"/>
-          <p:cNvSpPr>
-            <a:spLocks noGrp="1"/>
-          </p:cNvSpPr>
-          <p:nvPr>
-            <p:ph type="ctrTitle"/>
-          </p:nvPr>
-        </p:nvSpPr>
-        <p:spPr/>
-        <p:txBody>
-          <a:bodyPr/>
-          <a:lstStyle/>
-          <a:p/>
-          <a:p>
-            <a:r>
-              <a:t>Vivo hoje estou aqui</a:t>
-            </a:r>
-          </a:p>
-        </p:txBody>
-      </p:sp>
-      <p:sp>
-        <p:nvSpPr>
-          <p:cNvPr id="3" name="Subtitle 2"/>
-          <p:cNvSpPr>
-            <a:spLocks noGrp="1"/>
-          </p:cNvSpPr>
-          <p:nvPr>
-            <p:ph type="subTitle" idx="1"/>
-          </p:nvPr>
-        </p:nvSpPr>
-        <p:spPr/>
-        <p:txBody>
-          <a:bodyPr/>
-          <a:lstStyle/>
-          <a:p/>
-        </p:txBody>
-      </p:sp>
-    </p:spTree>
-  </p:cSld>
-  <p:clrMapOvr>
-    <a:masterClrMapping/>
-  </p:clrMapOvr>
-</p:sld>
-</file>
-
-<file path=ppt/slides/slide28.xml><?xml version="1.0" encoding="utf-8"?>
-<p:sld xmlns:a="http://schemas.openxmlformats.org/drawingml/2006/main" xmlns:p="http://schemas.openxmlformats.org/presentationml/2006/main" xmlns:r="http://schemas.openxmlformats.org/officeDocument/2006/relationships">
-  <p:cSld>
-    <p:spTree>
-      <p:nvGrpSpPr>
-        <p:cNvPr id="1" name=""/>
-        <p:cNvGrpSpPr/>
-        <p:nvPr/>
-      </p:nvGrpSpPr>
-      <p:grpSpPr/>
-      <p:sp>
-        <p:nvSpPr>
-          <p:cNvPr id="2" name="Title 1"/>
-          <p:cNvSpPr>
-            <a:spLocks noGrp="1"/>
-          </p:cNvSpPr>
-          <p:nvPr>
-            <p:ph type="ctrTitle"/>
-          </p:nvPr>
-        </p:nvSpPr>
-        <p:spPr/>
-        <p:txBody>
-          <a:bodyPr/>
-          <a:lstStyle/>
-          <a:p>
-            <a:r>
-              <a:t>Nos trouxe a redenção</a:t>
-            </a:r>
-          </a:p>
-          <a:p>
-            <a:r>
-              <a:t>A esperança retornou</a:t>
-            </a:r>
-          </a:p>
-        </p:txBody>
-      </p:sp>
-      <p:sp>
-        <p:nvSpPr>
-          <p:cNvPr id="3" name="Subtitle 2"/>
-          <p:cNvSpPr>
-            <a:spLocks noGrp="1"/>
-          </p:cNvSpPr>
-          <p:nvPr>
-            <p:ph type="subTitle" idx="1"/>
-          </p:nvPr>
-        </p:nvSpPr>
-        <p:spPr/>
-        <p:txBody>
-          <a:bodyPr/>
-          <a:lstStyle/>
-          <a:p/>
-        </p:txBody>
-      </p:sp>
-    </p:spTree>
-  </p:cSld>
-  <p:clrMapOvr>
-    <a:masterClrMapping/>
-  </p:clrMapOvr>
-</p:sld>
-</file>
-
-<file path=ppt/slides/slide29.xml><?xml version="1.0" encoding="utf-8"?>
-<p:sld xmlns:a="http://schemas.openxmlformats.org/drawingml/2006/main" xmlns:p="http://schemas.openxmlformats.org/presentationml/2006/main" xmlns:r="http://schemas.openxmlformats.org/officeDocument/2006/relationships">
-  <p:cSld>
-    <p:spTree>
-      <p:nvGrpSpPr>
-        <p:cNvPr id="1" name=""/>
-        <p:cNvGrpSpPr/>
-        <p:nvPr/>
-      </p:nvGrpSpPr>
-      <p:grpSpPr/>
-      <p:sp>
-        <p:nvSpPr>
-          <p:cNvPr id="2" name="Title 1"/>
-          <p:cNvSpPr>
-            <a:spLocks noGrp="1"/>
-          </p:cNvSpPr>
-          <p:nvPr>
-            <p:ph type="ctrTitle"/>
-          </p:nvPr>
-        </p:nvSpPr>
-        <p:spPr/>
-        <p:txBody>
-          <a:bodyPr/>
-          <a:lstStyle/>
-          <a:p>
-            <a:r>
-              <a:t>Jesus Cristo Rei dos reis</a:t>
-            </a:r>
-          </a:p>
-          <a:p>
-            <a:r>
-              <a:t>Nos trouxe a redenção</a:t>
             </a:r>
           </a:p>
         </p:txBody>
@@ -4451,6 +3378,12 @@
         <p:txBody>
           <a:bodyPr/>
           <a:lstStyle/>
+          <a:p/>
+          <a:p>
+            <a:r>
+              <a:t>O Seu sangue sobre mim</a:t>
+            </a:r>
+          </a:p>
           <a:p>
             <a:r>
               <a:t>Me comprou, me restaurou</a:t>
@@ -4459,478 +3392,6 @@
           <a:p>
             <a:r>
               <a:t>Sem culpa então me tornou</a:t>
-            </a:r>
-          </a:p>
-        </p:txBody>
-      </p:sp>
-      <p:sp>
-        <p:nvSpPr>
-          <p:cNvPr id="3" name="Subtitle 2"/>
-          <p:cNvSpPr>
-            <a:spLocks noGrp="1"/>
-          </p:cNvSpPr>
-          <p:nvPr>
-            <p:ph type="subTitle" idx="1"/>
-          </p:nvPr>
-        </p:nvSpPr>
-        <p:spPr/>
-        <p:txBody>
-          <a:bodyPr/>
-          <a:lstStyle/>
-          <a:p/>
-        </p:txBody>
-      </p:sp>
-    </p:spTree>
-  </p:cSld>
-  <p:clrMapOvr>
-    <a:masterClrMapping/>
-  </p:clrMapOvr>
-</p:sld>
-</file>
-
-<file path=ppt/slides/slide30.xml><?xml version="1.0" encoding="utf-8"?>
-<p:sld xmlns:a="http://schemas.openxmlformats.org/drawingml/2006/main" xmlns:p="http://schemas.openxmlformats.org/presentationml/2006/main" xmlns:r="http://schemas.openxmlformats.org/officeDocument/2006/relationships">
-  <p:cSld>
-    <p:spTree>
-      <p:nvGrpSpPr>
-        <p:cNvPr id="1" name=""/>
-        <p:cNvGrpSpPr/>
-        <p:nvPr/>
-      </p:nvGrpSpPr>
-      <p:grpSpPr/>
-      <p:sp>
-        <p:nvSpPr>
-          <p:cNvPr id="2" name="Title 1"/>
-          <p:cNvSpPr>
-            <a:spLocks noGrp="1"/>
-          </p:cNvSpPr>
-          <p:nvPr>
-            <p:ph type="ctrTitle"/>
-          </p:nvPr>
-        </p:nvSpPr>
-        <p:spPr/>
-        <p:txBody>
-          <a:bodyPr/>
-          <a:lstStyle/>
-          <a:p/>
-          <a:p>
-            <a:r>
-              <a:t>Jesus Cristo Rei dos reis</a:t>
-            </a:r>
-          </a:p>
-        </p:txBody>
-      </p:sp>
-      <p:sp>
-        <p:nvSpPr>
-          <p:cNvPr id="3" name="Subtitle 2"/>
-          <p:cNvSpPr>
-            <a:spLocks noGrp="1"/>
-          </p:cNvSpPr>
-          <p:nvPr>
-            <p:ph type="subTitle" idx="1"/>
-          </p:nvPr>
-        </p:nvSpPr>
-        <p:spPr/>
-        <p:txBody>
-          <a:bodyPr/>
-          <a:lstStyle/>
-          <a:p/>
-        </p:txBody>
-      </p:sp>
-    </p:spTree>
-  </p:cSld>
-  <p:clrMapOvr>
-    <a:masterClrMapping/>
-  </p:clrMapOvr>
-</p:sld>
-</file>
-
-<file path=ppt/slides/slide31.xml><?xml version="1.0" encoding="utf-8"?>
-<p:sld xmlns:a="http://schemas.openxmlformats.org/drawingml/2006/main" xmlns:p="http://schemas.openxmlformats.org/presentationml/2006/main" xmlns:r="http://schemas.openxmlformats.org/officeDocument/2006/relationships">
-  <p:cSld>
-    <p:spTree>
-      <p:nvGrpSpPr>
-        <p:cNvPr id="1" name=""/>
-        <p:cNvGrpSpPr/>
-        <p:nvPr/>
-      </p:nvGrpSpPr>
-      <p:grpSpPr/>
-      <p:sp>
-        <p:nvSpPr>
-          <p:cNvPr id="2" name="Title 1"/>
-          <p:cNvSpPr>
-            <a:spLocks noGrp="1"/>
-          </p:cNvSpPr>
-          <p:nvPr>
-            <p:ph type="ctrTitle"/>
-          </p:nvPr>
-        </p:nvSpPr>
-        <p:spPr/>
-        <p:txBody>
-          <a:bodyPr/>
-          <a:lstStyle/>
-          <a:p>
-            <a:r>
-              <a:t>Nele vou viver, posso amar</a:t>
-            </a:r>
-          </a:p>
-          <a:p>
-            <a:r>
-              <a:t>Toda morte e o sofrer não me assustarão jamais</a:t>
-            </a:r>
-          </a:p>
-        </p:txBody>
-      </p:sp>
-      <p:sp>
-        <p:nvSpPr>
-          <p:cNvPr id="3" name="Subtitle 2"/>
-          <p:cNvSpPr>
-            <a:spLocks noGrp="1"/>
-          </p:cNvSpPr>
-          <p:nvPr>
-            <p:ph type="subTitle" idx="1"/>
-          </p:nvPr>
-        </p:nvSpPr>
-        <p:spPr/>
-        <p:txBody>
-          <a:bodyPr/>
-          <a:lstStyle/>
-          <a:p/>
-        </p:txBody>
-      </p:sp>
-    </p:spTree>
-  </p:cSld>
-  <p:clrMapOvr>
-    <a:masterClrMapping/>
-  </p:clrMapOvr>
-</p:sld>
-</file>
-
-<file path=ppt/slides/slide32.xml><?xml version="1.0" encoding="utf-8"?>
-<p:sld xmlns:a="http://schemas.openxmlformats.org/drawingml/2006/main" xmlns:p="http://schemas.openxmlformats.org/presentationml/2006/main" xmlns:r="http://schemas.openxmlformats.org/officeDocument/2006/relationships">
-  <p:cSld>
-    <p:spTree>
-      <p:nvGrpSpPr>
-        <p:cNvPr id="1" name=""/>
-        <p:cNvGrpSpPr/>
-        <p:nvPr/>
-      </p:nvGrpSpPr>
-      <p:grpSpPr/>
-      <p:sp>
-        <p:nvSpPr>
-          <p:cNvPr id="2" name="Title 1"/>
-          <p:cNvSpPr>
-            <a:spLocks noGrp="1"/>
-          </p:cNvSpPr>
-          <p:nvPr>
-            <p:ph type="ctrTitle"/>
-          </p:nvPr>
-        </p:nvSpPr>
-        <p:spPr/>
-        <p:txBody>
-          <a:bodyPr/>
-          <a:lstStyle/>
-          <a:p>
-            <a:r>
-              <a:t>O passado já não mais tem poder pois novo sou</a:t>
-            </a:r>
-          </a:p>
-          <a:p>
-            <a:r>
-              <a:t>Nele vou viver, posso amar</a:t>
-            </a:r>
-          </a:p>
-        </p:txBody>
-      </p:sp>
-      <p:sp>
-        <p:nvSpPr>
-          <p:cNvPr id="3" name="Subtitle 2"/>
-          <p:cNvSpPr>
-            <a:spLocks noGrp="1"/>
-          </p:cNvSpPr>
-          <p:nvPr>
-            <p:ph type="subTitle" idx="1"/>
-          </p:nvPr>
-        </p:nvSpPr>
-        <p:spPr/>
-        <p:txBody>
-          <a:bodyPr/>
-          <a:lstStyle/>
-          <a:p/>
-        </p:txBody>
-      </p:sp>
-    </p:spTree>
-  </p:cSld>
-  <p:clrMapOvr>
-    <a:masterClrMapping/>
-  </p:clrMapOvr>
-</p:sld>
-</file>
-
-<file path=ppt/slides/slide33.xml><?xml version="1.0" encoding="utf-8"?>
-<p:sld xmlns:a="http://schemas.openxmlformats.org/drawingml/2006/main" xmlns:p="http://schemas.openxmlformats.org/presentationml/2006/main" xmlns:r="http://schemas.openxmlformats.org/officeDocument/2006/relationships">
-  <p:cSld>
-    <p:spTree>
-      <p:nvGrpSpPr>
-        <p:cNvPr id="1" name=""/>
-        <p:cNvGrpSpPr/>
-        <p:nvPr/>
-      </p:nvGrpSpPr>
-      <p:grpSpPr/>
-      <p:sp>
-        <p:nvSpPr>
-          <p:cNvPr id="2" name="Title 1"/>
-          <p:cNvSpPr>
-            <a:spLocks noGrp="1"/>
-          </p:cNvSpPr>
-          <p:nvPr>
-            <p:ph type="ctrTitle"/>
-          </p:nvPr>
-        </p:nvSpPr>
-        <p:spPr/>
-        <p:txBody>
-          <a:bodyPr/>
-          <a:lstStyle/>
-          <a:p/>
-          <a:p>
-            <a:r>
-              <a:t>O passado já não mais tem poder pois novo sou</a:t>
-            </a:r>
-          </a:p>
-        </p:txBody>
-      </p:sp>
-      <p:sp>
-        <p:nvSpPr>
-          <p:cNvPr id="3" name="Subtitle 2"/>
-          <p:cNvSpPr>
-            <a:spLocks noGrp="1"/>
-          </p:cNvSpPr>
-          <p:nvPr>
-            <p:ph type="subTitle" idx="1"/>
-          </p:nvPr>
-        </p:nvSpPr>
-        <p:spPr/>
-        <p:txBody>
-          <a:bodyPr/>
-          <a:lstStyle/>
-          <a:p/>
-        </p:txBody>
-      </p:sp>
-    </p:spTree>
-  </p:cSld>
-  <p:clrMapOvr>
-    <a:masterClrMapping/>
-  </p:clrMapOvr>
-</p:sld>
-</file>
-
-<file path=ppt/slides/slide34.xml><?xml version="1.0" encoding="utf-8"?>
-<p:sld xmlns:a="http://schemas.openxmlformats.org/drawingml/2006/main" xmlns:p="http://schemas.openxmlformats.org/presentationml/2006/main" xmlns:r="http://schemas.openxmlformats.org/officeDocument/2006/relationships">
-  <p:cSld>
-    <p:spTree>
-      <p:nvGrpSpPr>
-        <p:cNvPr id="1" name=""/>
-        <p:cNvGrpSpPr/>
-        <p:nvPr/>
-      </p:nvGrpSpPr>
-      <p:grpSpPr/>
-      <p:sp>
-        <p:nvSpPr>
-          <p:cNvPr id="2" name="Title 1"/>
-          <p:cNvSpPr>
-            <a:spLocks noGrp="1"/>
-          </p:cNvSpPr>
-          <p:nvPr>
-            <p:ph type="ctrTitle"/>
-          </p:nvPr>
-        </p:nvSpPr>
-        <p:spPr/>
-        <p:txBody>
-          <a:bodyPr/>
-          <a:lstStyle/>
-          <a:p>
-            <a:r>
-              <a:t>O Seu sangue sobre mim</a:t>
-            </a:r>
-          </a:p>
-          <a:p>
-            <a:r>
-              <a:t>Me comprou, me restaurou</a:t>
-            </a:r>
-          </a:p>
-        </p:txBody>
-      </p:sp>
-      <p:sp>
-        <p:nvSpPr>
-          <p:cNvPr id="3" name="Subtitle 2"/>
-          <p:cNvSpPr>
-            <a:spLocks noGrp="1"/>
-          </p:cNvSpPr>
-          <p:nvPr>
-            <p:ph type="subTitle" idx="1"/>
-          </p:nvPr>
-        </p:nvSpPr>
-        <p:spPr/>
-        <p:txBody>
-          <a:bodyPr/>
-          <a:lstStyle/>
-          <a:p/>
-        </p:txBody>
-      </p:sp>
-    </p:spTree>
-  </p:cSld>
-  <p:clrMapOvr>
-    <a:masterClrMapping/>
-  </p:clrMapOvr>
-</p:sld>
-</file>
-
-<file path=ppt/slides/slide35.xml><?xml version="1.0" encoding="utf-8"?>
-<p:sld xmlns:a="http://schemas.openxmlformats.org/drawingml/2006/main" xmlns:p="http://schemas.openxmlformats.org/presentationml/2006/main" xmlns:r="http://schemas.openxmlformats.org/officeDocument/2006/relationships">
-  <p:cSld>
-    <p:spTree>
-      <p:nvGrpSpPr>
-        <p:cNvPr id="1" name=""/>
-        <p:cNvGrpSpPr/>
-        <p:nvPr/>
-      </p:nvGrpSpPr>
-      <p:grpSpPr/>
-      <p:sp>
-        <p:nvSpPr>
-          <p:cNvPr id="2" name="Title 1"/>
-          <p:cNvSpPr>
-            <a:spLocks noGrp="1"/>
-          </p:cNvSpPr>
-          <p:nvPr>
-            <p:ph type="ctrTitle"/>
-          </p:nvPr>
-        </p:nvSpPr>
-        <p:spPr/>
-        <p:txBody>
-          <a:bodyPr/>
-          <a:lstStyle/>
-          <a:p/>
-          <a:p>
-            <a:r>
-              <a:t>O Seu sangue sobre mim</a:t>
-            </a:r>
-          </a:p>
-        </p:txBody>
-      </p:sp>
-      <p:sp>
-        <p:nvSpPr>
-          <p:cNvPr id="3" name="Subtitle 2"/>
-          <p:cNvSpPr>
-            <a:spLocks noGrp="1"/>
-          </p:cNvSpPr>
-          <p:nvPr>
-            <p:ph type="subTitle" idx="1"/>
-          </p:nvPr>
-        </p:nvSpPr>
-        <p:spPr/>
-        <p:txBody>
-          <a:bodyPr/>
-          <a:lstStyle/>
-          <a:p/>
-        </p:txBody>
-      </p:sp>
-    </p:spTree>
-  </p:cSld>
-  <p:clrMapOvr>
-    <a:masterClrMapping/>
-  </p:clrMapOvr>
-</p:sld>
-</file>
-
-<file path=ppt/slides/slide36.xml><?xml version="1.0" encoding="utf-8"?>
-<p:sld xmlns:a="http://schemas.openxmlformats.org/drawingml/2006/main" xmlns:p="http://schemas.openxmlformats.org/presentationml/2006/main" xmlns:r="http://schemas.openxmlformats.org/officeDocument/2006/relationships">
-  <p:cSld>
-    <p:spTree>
-      <p:nvGrpSpPr>
-        <p:cNvPr id="1" name=""/>
-        <p:cNvGrpSpPr/>
-        <p:nvPr/>
-      </p:nvGrpSpPr>
-      <p:grpSpPr/>
-      <p:sp>
-        <p:nvSpPr>
-          <p:cNvPr id="2" name="Title 1"/>
-          <p:cNvSpPr>
-            <a:spLocks noGrp="1"/>
-          </p:cNvSpPr>
-          <p:nvPr>
-            <p:ph type="ctrTitle"/>
-          </p:nvPr>
-        </p:nvSpPr>
-        <p:spPr/>
-        <p:txBody>
-          <a:bodyPr/>
-          <a:lstStyle/>
-          <a:p>
-            <a:r>
-              <a:t>Vivo hoje estou aqui</a:t>
-            </a:r>
-          </a:p>
-          <a:p>
-            <a:r>
-              <a:t>Pois Ele decidiu me amar</a:t>
-            </a:r>
-          </a:p>
-        </p:txBody>
-      </p:sp>
-      <p:sp>
-        <p:nvSpPr>
-          <p:cNvPr id="3" name="Subtitle 2"/>
-          <p:cNvSpPr>
-            <a:spLocks noGrp="1"/>
-          </p:cNvSpPr>
-          <p:nvPr>
-            <p:ph type="subTitle" idx="1"/>
-          </p:nvPr>
-        </p:nvSpPr>
-        <p:spPr/>
-        <p:txBody>
-          <a:bodyPr/>
-          <a:lstStyle/>
-          <a:p/>
-        </p:txBody>
-      </p:sp>
-    </p:spTree>
-  </p:cSld>
-  <p:clrMapOvr>
-    <a:masterClrMapping/>
-  </p:clrMapOvr>
-</p:sld>
-</file>
-
-<file path=ppt/slides/slide37.xml><?xml version="1.0" encoding="utf-8"?>
-<p:sld xmlns:a="http://schemas.openxmlformats.org/drawingml/2006/main" xmlns:p="http://schemas.openxmlformats.org/presentationml/2006/main" xmlns:r="http://schemas.openxmlformats.org/officeDocument/2006/relationships">
-  <p:cSld>
-    <p:spTree>
-      <p:nvGrpSpPr>
-        <p:cNvPr id="1" name=""/>
-        <p:cNvGrpSpPr/>
-        <p:nvPr/>
-      </p:nvGrpSpPr>
-      <p:grpSpPr/>
-      <p:sp>
-        <p:nvSpPr>
-          <p:cNvPr id="2" name="Title 1"/>
-          <p:cNvSpPr>
-            <a:spLocks noGrp="1"/>
-          </p:cNvSpPr>
-          <p:nvPr>
-            <p:ph type="ctrTitle"/>
-          </p:nvPr>
-        </p:nvSpPr>
-        <p:spPr/>
-        <p:txBody>
-          <a:bodyPr/>
-          <a:lstStyle/>
-          <a:p/>
-          <a:p>
-            <a:r>
-              <a:t>Vivo hoje estou aqui</a:t>
             </a:r>
           </a:p>
         </p:txBody>
@@ -4984,6 +3445,17 @@
         <p:txBody>
           <a:bodyPr/>
           <a:lstStyle/>
+          <a:p/>
+          <a:p>
+            <a:r>
+              <a:t>O passado já não mais tem poder pois novo sou</a:t>
+            </a:r>
+          </a:p>
+          <a:p>
+            <a:r>
+              <a:t>Nele vou viver, posso amar</a:t>
+            </a:r>
+          </a:p>
           <a:p>
             <a:r>
               <a:t>Toda morte e o sofrer não me assustarão jamais</a:t>
@@ -5045,6 +3517,17 @@
         <p:txBody>
           <a:bodyPr/>
           <a:lstStyle/>
+          <a:p/>
+          <a:p>
+            <a:r>
+              <a:t>Jesus Cristo Rei dos reis</a:t>
+            </a:r>
+          </a:p>
+          <a:p>
+            <a:r>
+              <a:t>Nos trouxe a redenção</a:t>
+            </a:r>
+          </a:p>
           <a:p>
             <a:r>
               <a:t>A esperança retornou</a:t>
@@ -5106,6 +3589,12 @@
         <p:txBody>
           <a:bodyPr/>
           <a:lstStyle/>
+          <a:p/>
+          <a:p>
+            <a:r>
+              <a:t>Vivo hoje estou aqui</a:t>
+            </a:r>
+          </a:p>
           <a:p>
             <a:r>
               <a:t>Pois Ele decidiu me amar</a:t>
@@ -5167,6 +3656,12 @@
         <p:txBody>
           <a:bodyPr/>
           <a:lstStyle/>
+          <a:p/>
+          <a:p>
+            <a:r>
+              <a:t>O Seu sangue sobre mim</a:t>
+            </a:r>
+          </a:p>
           <a:p>
             <a:r>
               <a:t>Me comprou me restaurou</a:t>
@@ -5228,6 +3723,17 @@
         <p:txBody>
           <a:bodyPr/>
           <a:lstStyle/>
+          <a:p/>
+          <a:p>
+            <a:r>
+              <a:t>O passado já não mais tem poder pois novo sou</a:t>
+            </a:r>
+          </a:p>
+          <a:p>
+            <a:r>
+              <a:t>Nele vou viver, posso amar</a:t>
+            </a:r>
+          </a:p>
           <a:p>
             <a:r>
               <a:t>Toda morte e o sofrer não me assustarão jamais</a:t>
@@ -5289,6 +3795,17 @@
         <p:txBody>
           <a:bodyPr/>
           <a:lstStyle/>
+          <a:p/>
+          <a:p>
+            <a:r>
+              <a:t>Tudo entregar, vou me render, aos Seus pés vou me lançar</a:t>
+            </a:r>
+          </a:p>
+          <a:p>
+            <a:r>
+              <a:t>Tudo entregar, vou me render, aos Seus pés vou me lançar</a:t>
+            </a:r>
+          </a:p>
           <a:p>
             <a:r>
               <a:t>Tudo entregar, vou me render, aos Seus pés vou me lançar</a:t>

</xml_diff>

<commit_message>
Pequenas progressões na parte visual
</commit_message>
<xml_diff>
--- a/redencao.pptx
+++ b/redencao.pptx
@@ -3156,56 +3156,47 @@
       <p:grpSpPr/>
       <p:sp>
         <p:nvSpPr>
-          <p:cNvPr id="2" name="Title 1"/>
-          <p:cNvSpPr>
-            <a:spLocks noGrp="1"/>
-          </p:cNvSpPr>
-          <p:nvPr>
-            <p:ph type="ctrTitle"/>
-          </p:nvPr>
-        </p:nvSpPr>
-        <p:spPr/>
-        <p:txBody>
-          <a:bodyPr/>
+          <p:cNvPr id="2" name="TextBox 1"/>
+          <p:cNvSpPr txBox="1"/>
+          <p:nvPr/>
+        </p:nvSpPr>
+        <p:spPr>
+          <a:xfrm>
+            <a:off x="0" y="1800000"/>
+            <a:ext cx="7200000" cy="3600000"/>
+          </a:xfrm>
+          <a:prstGeom prst="rect">
+            <a:avLst/>
+          </a:prstGeom>
+          <a:noFill/>
+        </p:spPr>
+        <p:txBody>
+          <a:bodyPr wrap="none">
+            <a:spAutoFit/>
+          </a:bodyPr>
           <a:lstStyle/>
           <a:p/>
           <a:p>
+            <a:br/>
+            <a:pPr algn="ctr">
+              <a:defRPr sz="3000"/>
+            </a:pPr>
             <a:r>
               <a:t>O passado já não mais tem poder pois novo sou</a:t>
             </a:r>
-          </a:p>
-          <a:p>
+            <a:br/>
             <a:r>
               <a:t>Nele vou viver, posso amar</a:t>
             </a:r>
-          </a:p>
-          <a:p>
+            <a:br/>
             <a:r>
               <a:t>Toda morte e o sofrer não me assustarão jamais</a:t>
             </a:r>
-          </a:p>
-          <a:p>
+            <a:br/>
             <a:r>
               <a:t>Pois foi Ele quem venceu em meu lugar</a:t>
             </a:r>
           </a:p>
-        </p:txBody>
-      </p:sp>
-      <p:sp>
-        <p:nvSpPr>
-          <p:cNvPr id="3" name="Subtitle 2"/>
-          <p:cNvSpPr>
-            <a:spLocks noGrp="1"/>
-          </p:cNvSpPr>
-          <p:nvPr>
-            <p:ph type="subTitle" idx="1"/>
-          </p:nvPr>
-        </p:nvSpPr>
-        <p:spPr/>
-        <p:txBody>
-          <a:bodyPr/>
-          <a:lstStyle/>
-          <a:p/>
         </p:txBody>
       </p:sp>
     </p:spTree>
@@ -3228,56 +3219,47 @@
       <p:grpSpPr/>
       <p:sp>
         <p:nvSpPr>
-          <p:cNvPr id="2" name="Title 1"/>
-          <p:cNvSpPr>
-            <a:spLocks noGrp="1"/>
-          </p:cNvSpPr>
-          <p:nvPr>
-            <p:ph type="ctrTitle"/>
-          </p:nvPr>
-        </p:nvSpPr>
-        <p:spPr/>
-        <p:txBody>
-          <a:bodyPr/>
+          <p:cNvPr id="2" name="TextBox 1"/>
+          <p:cNvSpPr txBox="1"/>
+          <p:nvPr/>
+        </p:nvSpPr>
+        <p:spPr>
+          <a:xfrm>
+            <a:off x="0" y="1800000"/>
+            <a:ext cx="7200000" cy="3600000"/>
+          </a:xfrm>
+          <a:prstGeom prst="rect">
+            <a:avLst/>
+          </a:prstGeom>
+          <a:noFill/>
+        </p:spPr>
+        <p:txBody>
+          <a:bodyPr wrap="none">
+            <a:spAutoFit/>
+          </a:bodyPr>
           <a:lstStyle/>
           <a:p/>
           <a:p>
+            <a:br/>
+            <a:pPr algn="ctr">
+              <a:defRPr sz="3000"/>
+            </a:pPr>
             <a:r>
               <a:t>Jesus Cristo Rei dos reis</a:t>
             </a:r>
-          </a:p>
-          <a:p>
+            <a:br/>
             <a:r>
               <a:t>Nos trouxe a redenção</a:t>
             </a:r>
-          </a:p>
-          <a:p>
+            <a:br/>
             <a:r>
               <a:t>A esperança retornou</a:t>
             </a:r>
-          </a:p>
-          <a:p>
+            <a:br/>
             <a:r>
               <a:t>Graça e paz nos revelou</a:t>
             </a:r>
           </a:p>
-        </p:txBody>
-      </p:sp>
-      <p:sp>
-        <p:nvSpPr>
-          <p:cNvPr id="3" name="Subtitle 2"/>
-          <p:cNvSpPr>
-            <a:spLocks noGrp="1"/>
-          </p:cNvSpPr>
-          <p:nvPr>
-            <p:ph type="subTitle" idx="1"/>
-          </p:nvPr>
-        </p:nvSpPr>
-        <p:spPr/>
-        <p:txBody>
-          <a:bodyPr/>
-          <a:lstStyle/>
-          <a:p/>
         </p:txBody>
       </p:sp>
     </p:spTree>
@@ -3300,50 +3282,42 @@
       <p:grpSpPr/>
       <p:sp>
         <p:nvSpPr>
-          <p:cNvPr id="2" name="Title 1"/>
-          <p:cNvSpPr>
-            <a:spLocks noGrp="1"/>
-          </p:cNvSpPr>
-          <p:nvPr>
-            <p:ph type="ctrTitle"/>
-          </p:nvPr>
-        </p:nvSpPr>
-        <p:spPr/>
-        <p:txBody>
-          <a:bodyPr/>
-          <a:lstStyle/>
-          <a:p>
+          <p:cNvPr id="2" name="TextBox 1"/>
+          <p:cNvSpPr txBox="1"/>
+          <p:nvPr/>
+        </p:nvSpPr>
+        <p:spPr>
+          <a:xfrm>
+            <a:off x="0" y="1800000"/>
+            <a:ext cx="7200000" cy="3600000"/>
+          </a:xfrm>
+          <a:prstGeom prst="rect">
+            <a:avLst/>
+          </a:prstGeom>
+          <a:noFill/>
+        </p:spPr>
+        <p:txBody>
+          <a:bodyPr wrap="none">
+            <a:spAutoFit/>
+          </a:bodyPr>
+          <a:lstStyle/>
+          <a:p/>
+          <a:p>
+            <a:pPr algn="ctr">
+              <a:defRPr sz="3000"/>
+            </a:pPr>
             <a:r>
               <a:t>Vivo hoje estou aqui</a:t>
             </a:r>
-          </a:p>
-          <a:p>
+            <a:br/>
             <a:r>
               <a:t>Pois Ele decidiu me amar</a:t>
             </a:r>
-          </a:p>
-          <a:p>
+            <a:br/>
             <a:r>
               <a:t>E então eu posso livre andar</a:t>
             </a:r>
           </a:p>
-        </p:txBody>
-      </p:sp>
-      <p:sp>
-        <p:nvSpPr>
-          <p:cNvPr id="3" name="Subtitle 2"/>
-          <p:cNvSpPr>
-            <a:spLocks noGrp="1"/>
-          </p:cNvSpPr>
-          <p:nvPr>
-            <p:ph type="subTitle" idx="1"/>
-          </p:nvPr>
-        </p:nvSpPr>
-        <p:spPr/>
-        <p:txBody>
-          <a:bodyPr/>
-          <a:lstStyle/>
-          <a:p/>
         </p:txBody>
       </p:sp>
     </p:spTree>
@@ -3366,51 +3340,43 @@
       <p:grpSpPr/>
       <p:sp>
         <p:nvSpPr>
-          <p:cNvPr id="2" name="Title 1"/>
-          <p:cNvSpPr>
-            <a:spLocks noGrp="1"/>
-          </p:cNvSpPr>
-          <p:nvPr>
-            <p:ph type="ctrTitle"/>
-          </p:nvPr>
-        </p:nvSpPr>
-        <p:spPr/>
-        <p:txBody>
-          <a:bodyPr/>
+          <p:cNvPr id="2" name="TextBox 1"/>
+          <p:cNvSpPr txBox="1"/>
+          <p:nvPr/>
+        </p:nvSpPr>
+        <p:spPr>
+          <a:xfrm>
+            <a:off x="0" y="1800000"/>
+            <a:ext cx="7200000" cy="3600000"/>
+          </a:xfrm>
+          <a:prstGeom prst="rect">
+            <a:avLst/>
+          </a:prstGeom>
+          <a:noFill/>
+        </p:spPr>
+        <p:txBody>
+          <a:bodyPr wrap="none">
+            <a:spAutoFit/>
+          </a:bodyPr>
           <a:lstStyle/>
           <a:p/>
           <a:p>
+            <a:br/>
+            <a:pPr algn="ctr">
+              <a:defRPr sz="3000"/>
+            </a:pPr>
             <a:r>
               <a:t>O Seu sangue sobre mim</a:t>
             </a:r>
-          </a:p>
-          <a:p>
+            <a:br/>
             <a:r>
               <a:t>Me comprou, me restaurou</a:t>
             </a:r>
-          </a:p>
-          <a:p>
+            <a:br/>
             <a:r>
               <a:t>Sem culpa então me tornou</a:t>
             </a:r>
           </a:p>
-        </p:txBody>
-      </p:sp>
-      <p:sp>
-        <p:nvSpPr>
-          <p:cNvPr id="3" name="Subtitle 2"/>
-          <p:cNvSpPr>
-            <a:spLocks noGrp="1"/>
-          </p:cNvSpPr>
-          <p:nvPr>
-            <p:ph type="subTitle" idx="1"/>
-          </p:nvPr>
-        </p:nvSpPr>
-        <p:spPr/>
-        <p:txBody>
-          <a:bodyPr/>
-          <a:lstStyle/>
-          <a:p/>
         </p:txBody>
       </p:sp>
     </p:spTree>
@@ -3433,56 +3399,47 @@
       <p:grpSpPr/>
       <p:sp>
         <p:nvSpPr>
-          <p:cNvPr id="2" name="Title 1"/>
-          <p:cNvSpPr>
-            <a:spLocks noGrp="1"/>
-          </p:cNvSpPr>
-          <p:nvPr>
-            <p:ph type="ctrTitle"/>
-          </p:nvPr>
-        </p:nvSpPr>
-        <p:spPr/>
-        <p:txBody>
-          <a:bodyPr/>
+          <p:cNvPr id="2" name="TextBox 1"/>
+          <p:cNvSpPr txBox="1"/>
+          <p:nvPr/>
+        </p:nvSpPr>
+        <p:spPr>
+          <a:xfrm>
+            <a:off x="0" y="1800000"/>
+            <a:ext cx="7200000" cy="3600000"/>
+          </a:xfrm>
+          <a:prstGeom prst="rect">
+            <a:avLst/>
+          </a:prstGeom>
+          <a:noFill/>
+        </p:spPr>
+        <p:txBody>
+          <a:bodyPr wrap="none">
+            <a:spAutoFit/>
+          </a:bodyPr>
           <a:lstStyle/>
           <a:p/>
           <a:p>
+            <a:br/>
+            <a:pPr algn="ctr">
+              <a:defRPr sz="3000"/>
+            </a:pPr>
             <a:r>
               <a:t>O passado já não mais tem poder pois novo sou</a:t>
             </a:r>
-          </a:p>
-          <a:p>
+            <a:br/>
             <a:r>
               <a:t>Nele vou viver, posso amar</a:t>
             </a:r>
-          </a:p>
-          <a:p>
+            <a:br/>
             <a:r>
               <a:t>Toda morte e o sofrer não me assustarão jamais</a:t>
             </a:r>
-          </a:p>
-          <a:p>
+            <a:br/>
             <a:r>
               <a:t>Pois foi Ele quem venceu em meu lugar</a:t>
             </a:r>
           </a:p>
-        </p:txBody>
-      </p:sp>
-      <p:sp>
-        <p:nvSpPr>
-          <p:cNvPr id="3" name="Subtitle 2"/>
-          <p:cNvSpPr>
-            <a:spLocks noGrp="1"/>
-          </p:cNvSpPr>
-          <p:nvPr>
-            <p:ph type="subTitle" idx="1"/>
-          </p:nvPr>
-        </p:nvSpPr>
-        <p:spPr/>
-        <p:txBody>
-          <a:bodyPr/>
-          <a:lstStyle/>
-          <a:p/>
         </p:txBody>
       </p:sp>
     </p:spTree>
@@ -3505,56 +3462,47 @@
       <p:grpSpPr/>
       <p:sp>
         <p:nvSpPr>
-          <p:cNvPr id="2" name="Title 1"/>
-          <p:cNvSpPr>
-            <a:spLocks noGrp="1"/>
-          </p:cNvSpPr>
-          <p:nvPr>
-            <p:ph type="ctrTitle"/>
-          </p:nvPr>
-        </p:nvSpPr>
-        <p:spPr/>
-        <p:txBody>
-          <a:bodyPr/>
+          <p:cNvPr id="2" name="TextBox 1"/>
+          <p:cNvSpPr txBox="1"/>
+          <p:nvPr/>
+        </p:nvSpPr>
+        <p:spPr>
+          <a:xfrm>
+            <a:off x="0" y="1800000"/>
+            <a:ext cx="7200000" cy="3600000"/>
+          </a:xfrm>
+          <a:prstGeom prst="rect">
+            <a:avLst/>
+          </a:prstGeom>
+          <a:noFill/>
+        </p:spPr>
+        <p:txBody>
+          <a:bodyPr wrap="none">
+            <a:spAutoFit/>
+          </a:bodyPr>
           <a:lstStyle/>
           <a:p/>
           <a:p>
+            <a:br/>
+            <a:pPr algn="ctr">
+              <a:defRPr sz="3000"/>
+            </a:pPr>
             <a:r>
               <a:t>Jesus Cristo Rei dos reis</a:t>
             </a:r>
-          </a:p>
-          <a:p>
+            <a:br/>
             <a:r>
               <a:t>Nos trouxe a redenção</a:t>
             </a:r>
-          </a:p>
-          <a:p>
+            <a:br/>
             <a:r>
               <a:t>A esperança retornou</a:t>
             </a:r>
-          </a:p>
-          <a:p>
+            <a:br/>
             <a:r>
               <a:t>Graça e paz nos revelou</a:t>
             </a:r>
           </a:p>
-        </p:txBody>
-      </p:sp>
-      <p:sp>
-        <p:nvSpPr>
-          <p:cNvPr id="3" name="Subtitle 2"/>
-          <p:cNvSpPr>
-            <a:spLocks noGrp="1"/>
-          </p:cNvSpPr>
-          <p:nvPr>
-            <p:ph type="subTitle" idx="1"/>
-          </p:nvPr>
-        </p:nvSpPr>
-        <p:spPr/>
-        <p:txBody>
-          <a:bodyPr/>
-          <a:lstStyle/>
-          <a:p/>
         </p:txBody>
       </p:sp>
     </p:spTree>
@@ -3577,51 +3525,43 @@
       <p:grpSpPr/>
       <p:sp>
         <p:nvSpPr>
-          <p:cNvPr id="2" name="Title 1"/>
-          <p:cNvSpPr>
-            <a:spLocks noGrp="1"/>
-          </p:cNvSpPr>
-          <p:nvPr>
-            <p:ph type="ctrTitle"/>
-          </p:nvPr>
-        </p:nvSpPr>
-        <p:spPr/>
-        <p:txBody>
-          <a:bodyPr/>
+          <p:cNvPr id="2" name="TextBox 1"/>
+          <p:cNvSpPr txBox="1"/>
+          <p:nvPr/>
+        </p:nvSpPr>
+        <p:spPr>
+          <a:xfrm>
+            <a:off x="0" y="1800000"/>
+            <a:ext cx="7200000" cy="3600000"/>
+          </a:xfrm>
+          <a:prstGeom prst="rect">
+            <a:avLst/>
+          </a:prstGeom>
+          <a:noFill/>
+        </p:spPr>
+        <p:txBody>
+          <a:bodyPr wrap="none">
+            <a:spAutoFit/>
+          </a:bodyPr>
           <a:lstStyle/>
           <a:p/>
           <a:p>
+            <a:br/>
+            <a:pPr algn="ctr">
+              <a:defRPr sz="3000"/>
+            </a:pPr>
             <a:r>
               <a:t>Vivo hoje estou aqui</a:t>
             </a:r>
-          </a:p>
-          <a:p>
+            <a:br/>
             <a:r>
               <a:t>Pois Ele decidiu me amar</a:t>
             </a:r>
-          </a:p>
-          <a:p>
+            <a:br/>
             <a:r>
               <a:t>E então eu posso livre andar</a:t>
             </a:r>
           </a:p>
-        </p:txBody>
-      </p:sp>
-      <p:sp>
-        <p:nvSpPr>
-          <p:cNvPr id="3" name="Subtitle 2"/>
-          <p:cNvSpPr>
-            <a:spLocks noGrp="1"/>
-          </p:cNvSpPr>
-          <p:nvPr>
-            <p:ph type="subTitle" idx="1"/>
-          </p:nvPr>
-        </p:nvSpPr>
-        <p:spPr/>
-        <p:txBody>
-          <a:bodyPr/>
-          <a:lstStyle/>
-          <a:p/>
         </p:txBody>
       </p:sp>
     </p:spTree>
@@ -3644,51 +3584,43 @@
       <p:grpSpPr/>
       <p:sp>
         <p:nvSpPr>
-          <p:cNvPr id="2" name="Title 1"/>
-          <p:cNvSpPr>
-            <a:spLocks noGrp="1"/>
-          </p:cNvSpPr>
-          <p:nvPr>
-            <p:ph type="ctrTitle"/>
-          </p:nvPr>
-        </p:nvSpPr>
-        <p:spPr/>
-        <p:txBody>
-          <a:bodyPr/>
+          <p:cNvPr id="2" name="TextBox 1"/>
+          <p:cNvSpPr txBox="1"/>
+          <p:nvPr/>
+        </p:nvSpPr>
+        <p:spPr>
+          <a:xfrm>
+            <a:off x="0" y="1800000"/>
+            <a:ext cx="7200000" cy="3600000"/>
+          </a:xfrm>
+          <a:prstGeom prst="rect">
+            <a:avLst/>
+          </a:prstGeom>
+          <a:noFill/>
+        </p:spPr>
+        <p:txBody>
+          <a:bodyPr wrap="none">
+            <a:spAutoFit/>
+          </a:bodyPr>
           <a:lstStyle/>
           <a:p/>
           <a:p>
+            <a:br/>
+            <a:pPr algn="ctr">
+              <a:defRPr sz="3000"/>
+            </a:pPr>
             <a:r>
               <a:t>O Seu sangue sobre mim</a:t>
             </a:r>
-          </a:p>
-          <a:p>
+            <a:br/>
             <a:r>
               <a:t>Me comprou me restaurou</a:t>
             </a:r>
-          </a:p>
-          <a:p>
+            <a:br/>
             <a:r>
               <a:t>Sem culpa então me tornou</a:t>
             </a:r>
           </a:p>
-        </p:txBody>
-      </p:sp>
-      <p:sp>
-        <p:nvSpPr>
-          <p:cNvPr id="3" name="Subtitle 2"/>
-          <p:cNvSpPr>
-            <a:spLocks noGrp="1"/>
-          </p:cNvSpPr>
-          <p:nvPr>
-            <p:ph type="subTitle" idx="1"/>
-          </p:nvPr>
-        </p:nvSpPr>
-        <p:spPr/>
-        <p:txBody>
-          <a:bodyPr/>
-          <a:lstStyle/>
-          <a:p/>
         </p:txBody>
       </p:sp>
     </p:spTree>
@@ -3711,56 +3643,47 @@
       <p:grpSpPr/>
       <p:sp>
         <p:nvSpPr>
-          <p:cNvPr id="2" name="Title 1"/>
-          <p:cNvSpPr>
-            <a:spLocks noGrp="1"/>
-          </p:cNvSpPr>
-          <p:nvPr>
-            <p:ph type="ctrTitle"/>
-          </p:nvPr>
-        </p:nvSpPr>
-        <p:spPr/>
-        <p:txBody>
-          <a:bodyPr/>
+          <p:cNvPr id="2" name="TextBox 1"/>
+          <p:cNvSpPr txBox="1"/>
+          <p:nvPr/>
+        </p:nvSpPr>
+        <p:spPr>
+          <a:xfrm>
+            <a:off x="0" y="1800000"/>
+            <a:ext cx="7200000" cy="3600000"/>
+          </a:xfrm>
+          <a:prstGeom prst="rect">
+            <a:avLst/>
+          </a:prstGeom>
+          <a:noFill/>
+        </p:spPr>
+        <p:txBody>
+          <a:bodyPr wrap="none">
+            <a:spAutoFit/>
+          </a:bodyPr>
           <a:lstStyle/>
           <a:p/>
           <a:p>
+            <a:br/>
+            <a:pPr algn="ctr">
+              <a:defRPr sz="3000"/>
+            </a:pPr>
             <a:r>
               <a:t>O passado já não mais tem poder pois novo sou</a:t>
             </a:r>
-          </a:p>
-          <a:p>
+            <a:br/>
             <a:r>
               <a:t>Nele vou viver, posso amar</a:t>
             </a:r>
-          </a:p>
-          <a:p>
+            <a:br/>
             <a:r>
               <a:t>Toda morte e o sofrer não me assustarão jamais</a:t>
             </a:r>
-          </a:p>
-          <a:p>
+            <a:br/>
             <a:r>
               <a:t>Pois foi Ele quem venceu em meu lugar</a:t>
             </a:r>
           </a:p>
-        </p:txBody>
-      </p:sp>
-      <p:sp>
-        <p:nvSpPr>
-          <p:cNvPr id="3" name="Subtitle 2"/>
-          <p:cNvSpPr>
-            <a:spLocks noGrp="1"/>
-          </p:cNvSpPr>
-          <p:nvPr>
-            <p:ph type="subTitle" idx="1"/>
-          </p:nvPr>
-        </p:nvSpPr>
-        <p:spPr/>
-        <p:txBody>
-          <a:bodyPr/>
-          <a:lstStyle/>
-          <a:p/>
         </p:txBody>
       </p:sp>
     </p:spTree>
@@ -3783,56 +3706,47 @@
       <p:grpSpPr/>
       <p:sp>
         <p:nvSpPr>
-          <p:cNvPr id="2" name="Title 1"/>
-          <p:cNvSpPr>
-            <a:spLocks noGrp="1"/>
-          </p:cNvSpPr>
-          <p:nvPr>
-            <p:ph type="ctrTitle"/>
-          </p:nvPr>
-        </p:nvSpPr>
-        <p:spPr/>
-        <p:txBody>
-          <a:bodyPr/>
+          <p:cNvPr id="2" name="TextBox 1"/>
+          <p:cNvSpPr txBox="1"/>
+          <p:nvPr/>
+        </p:nvSpPr>
+        <p:spPr>
+          <a:xfrm>
+            <a:off x="0" y="1800000"/>
+            <a:ext cx="7200000" cy="3600000"/>
+          </a:xfrm>
+          <a:prstGeom prst="rect">
+            <a:avLst/>
+          </a:prstGeom>
+          <a:noFill/>
+        </p:spPr>
+        <p:txBody>
+          <a:bodyPr wrap="none">
+            <a:spAutoFit/>
+          </a:bodyPr>
           <a:lstStyle/>
           <a:p/>
           <a:p>
+            <a:br/>
+            <a:pPr algn="ctr">
+              <a:defRPr sz="3000"/>
+            </a:pPr>
             <a:r>
               <a:t>Tudo entregar, vou me render, aos Seus pés vou me lançar</a:t>
             </a:r>
-          </a:p>
-          <a:p>
+            <a:br/>
             <a:r>
               <a:t>Tudo entregar, vou me render, aos Seus pés vou me lançar</a:t>
             </a:r>
-          </a:p>
-          <a:p>
+            <a:br/>
             <a:r>
               <a:t>Tudo entregar, vou me render, aos Seus pés vou me lançar</a:t>
             </a:r>
-          </a:p>
-          <a:p>
+            <a:br/>
             <a:r>
               <a:t>Tudo entregar, vou me render, aos Seus pés vou me lançar</a:t>
             </a:r>
           </a:p>
-        </p:txBody>
-      </p:sp>
-      <p:sp>
-        <p:nvSpPr>
-          <p:cNvPr id="3" name="Subtitle 2"/>
-          <p:cNvSpPr>
-            <a:spLocks noGrp="1"/>
-          </p:cNvSpPr>
-          <p:nvPr>
-            <p:ph type="subTitle" idx="1"/>
-          </p:nvPr>
-        </p:nvSpPr>
-        <p:spPr/>
-        <p:txBody>
-          <a:bodyPr/>
-          <a:lstStyle/>
-          <a:p/>
         </p:txBody>
       </p:sp>
     </p:spTree>

</xml_diff>